<commit_message>
added to the power point
</commit_message>
<xml_diff>
--- a/results/Naturally_Curly.pptx
+++ b/results/Naturally_Curly.pptx
@@ -7,13 +7,14 @@
   <p:sldIdLst>
     <p:sldId id="256" r:id="rId2"/>
     <p:sldId id="257" r:id="rId3"/>
-    <p:sldId id="258" r:id="rId4"/>
-    <p:sldId id="260" r:id="rId5"/>
-    <p:sldId id="259" r:id="rId6"/>
-    <p:sldId id="261" r:id="rId7"/>
-    <p:sldId id="263" r:id="rId8"/>
-    <p:sldId id="262" r:id="rId9"/>
-    <p:sldId id="264" r:id="rId10"/>
+    <p:sldId id="265" r:id="rId4"/>
+    <p:sldId id="258" r:id="rId5"/>
+    <p:sldId id="260" r:id="rId6"/>
+    <p:sldId id="259" r:id="rId7"/>
+    <p:sldId id="261" r:id="rId8"/>
+    <p:sldId id="263" r:id="rId9"/>
+    <p:sldId id="262" r:id="rId10"/>
+    <p:sldId id="264" r:id="rId11"/>
   </p:sldIdLst>
   <p:sldSz cx="12192000" cy="6858000"/>
   <p:notesSz cx="6858000" cy="9144000"/>
@@ -5906,6 +5907,156 @@
 </p:sld>
 </file>
 
+<file path=ppt/slides/slide10.xml><?xml version="1.0" encoding="utf-8"?>
+<p:sld xmlns:a="http://schemas.openxmlformats.org/drawingml/2006/main" xmlns:r="http://schemas.openxmlformats.org/officeDocument/2006/relationships" xmlns:p="http://schemas.openxmlformats.org/presentationml/2006/main">
+  <p:cSld>
+    <p:spTree>
+      <p:nvGrpSpPr>
+        <p:cNvPr id="1" name=""/>
+        <p:cNvGrpSpPr/>
+        <p:nvPr/>
+      </p:nvGrpSpPr>
+      <p:grpSpPr>
+        <a:xfrm>
+          <a:off x="0" y="0"/>
+          <a:ext cx="0" cy="0"/>
+          <a:chOff x="0" y="0"/>
+          <a:chExt cx="0" cy="0"/>
+        </a:xfrm>
+      </p:grpSpPr>
+      <p:sp>
+        <p:nvSpPr>
+          <p:cNvPr id="2" name="Title 1">
+            <a:extLst>
+              <a:ext uri="{FF2B5EF4-FFF2-40B4-BE49-F238E27FC236}">
+                <a16:creationId xmlns:a16="http://schemas.microsoft.com/office/drawing/2014/main" id="{44FFD62D-2195-914A-A2EA-8D237D1B655C}"/>
+              </a:ext>
+            </a:extLst>
+          </p:cNvPr>
+          <p:cNvSpPr>
+            <a:spLocks noGrp="1"/>
+          </p:cNvSpPr>
+          <p:nvPr>
+            <p:ph type="title"/>
+          </p:nvPr>
+        </p:nvSpPr>
+        <p:spPr/>
+        <p:txBody>
+          <a:bodyPr/>
+          <a:lstStyle/>
+          <a:p>
+            <a:r>
+              <a:rPr lang="en-US" dirty="0"/>
+              <a:t>Results</a:t>
+            </a:r>
+          </a:p>
+        </p:txBody>
+      </p:sp>
+      <p:sp>
+        <p:nvSpPr>
+          <p:cNvPr id="3" name="Content Placeholder 2">
+            <a:extLst>
+              <a:ext uri="{FF2B5EF4-FFF2-40B4-BE49-F238E27FC236}">
+                <a16:creationId xmlns:a16="http://schemas.microsoft.com/office/drawing/2014/main" id="{35D98C07-1861-024E-BC0B-CDCD1C90C514}"/>
+              </a:ext>
+            </a:extLst>
+          </p:cNvPr>
+          <p:cNvSpPr>
+            <a:spLocks noGrp="1"/>
+          </p:cNvSpPr>
+          <p:nvPr>
+            <p:ph idx="1"/>
+          </p:nvPr>
+        </p:nvSpPr>
+        <p:spPr/>
+        <p:txBody>
+          <a:bodyPr/>
+          <a:lstStyle/>
+          <a:p>
+            <a:r>
+              <a:rPr lang="en-US"/>
+              <a:t>Models Used:</a:t>
+            </a:r>
+            <a:endParaRPr lang="en-US" dirty="0"/>
+          </a:p>
+          <a:p>
+            <a:pPr lvl="1"/>
+            <a:r>
+              <a:rPr lang="en-US" dirty="0" err="1"/>
+              <a:t>LinearSVC</a:t>
+            </a:r>
+            <a:r>
+              <a:rPr lang="en-US" dirty="0"/>
+              <a:t> </a:t>
+            </a:r>
+          </a:p>
+          <a:p>
+            <a:pPr lvl="1"/>
+            <a:r>
+              <a:rPr lang="en-US" dirty="0" err="1"/>
+              <a:t>LogisticRegression</a:t>
+            </a:r>
+            <a:r>
+              <a:rPr lang="en-US" dirty="0"/>
+              <a:t> </a:t>
+            </a:r>
+          </a:p>
+          <a:p>
+            <a:pPr lvl="1"/>
+            <a:r>
+              <a:rPr lang="en-US" dirty="0" err="1"/>
+              <a:t>MultinomialNB</a:t>
+            </a:r>
+            <a:r>
+              <a:rPr lang="en-US" dirty="0"/>
+              <a:t> </a:t>
+            </a:r>
+          </a:p>
+          <a:p>
+            <a:pPr lvl="1"/>
+            <a:r>
+              <a:rPr lang="en-US" dirty="0" err="1"/>
+              <a:t>RandomForestClassifier</a:t>
+            </a:r>
+            <a:endParaRPr lang="en-US" dirty="0"/>
+          </a:p>
+          <a:p>
+            <a:r>
+              <a:rPr lang="en-US" dirty="0"/>
+              <a:t>Metric</a:t>
+            </a:r>
+          </a:p>
+          <a:p>
+            <a:pPr lvl="1"/>
+            <a:r>
+              <a:rPr lang="en-US" dirty="0"/>
+              <a:t>Accuracy</a:t>
+            </a:r>
+          </a:p>
+          <a:p>
+            <a:r>
+              <a:rPr lang="en-US" dirty="0"/>
+              <a:t>Logistic Regression was consistently outperforming other models and Multinomial Naïve Bayes was a close second</a:t>
+            </a:r>
+          </a:p>
+          <a:p>
+            <a:endParaRPr lang="en-US" dirty="0"/>
+          </a:p>
+        </p:txBody>
+      </p:sp>
+    </p:spTree>
+    <p:extLst>
+      <p:ext uri="{BB962C8B-B14F-4D97-AF65-F5344CB8AC3E}">
+        <p14:creationId xmlns:p14="http://schemas.microsoft.com/office/powerpoint/2010/main" val="1443540364"/>
+      </p:ext>
+    </p:extLst>
+  </p:cSld>
+  <p:clrMapOvr>
+    <a:masterClrMapping/>
+  </p:clrMapOvr>
+</p:sld>
+</file>
+
 <file path=ppt/slides/slide2.xml><?xml version="1.0" encoding="utf-8"?>
 <p:sld xmlns:a="http://schemas.openxmlformats.org/drawingml/2006/main" xmlns:r="http://schemas.openxmlformats.org/officeDocument/2006/relationships" xmlns:p="http://schemas.openxmlformats.org/presentationml/2006/main">
   <p:cSld>
@@ -6148,6 +6299,94 @@
       </p:grpSpPr>
       <p:sp>
         <p:nvSpPr>
+          <p:cNvPr id="2" name="Title 1">
+            <a:extLst>
+              <a:ext uri="{FF2B5EF4-FFF2-40B4-BE49-F238E27FC236}">
+                <a16:creationId xmlns:a16="http://schemas.microsoft.com/office/drawing/2014/main" id="{A42F1AC4-BC21-D44C-B683-4FE9E5F4627B}"/>
+              </a:ext>
+            </a:extLst>
+          </p:cNvPr>
+          <p:cNvSpPr>
+            <a:spLocks noGrp="1"/>
+          </p:cNvSpPr>
+          <p:nvPr>
+            <p:ph type="title"/>
+          </p:nvPr>
+        </p:nvSpPr>
+        <p:spPr/>
+        <p:txBody>
+          <a:bodyPr/>
+          <a:lstStyle/>
+          <a:p>
+            <a:r>
+              <a:rPr lang="en-US" dirty="0"/>
+              <a:t>Driving Question</a:t>
+            </a:r>
+          </a:p>
+        </p:txBody>
+      </p:sp>
+      <p:sp>
+        <p:nvSpPr>
+          <p:cNvPr id="3" name="Content Placeholder 2">
+            <a:extLst>
+              <a:ext uri="{FF2B5EF4-FFF2-40B4-BE49-F238E27FC236}">
+                <a16:creationId xmlns:a16="http://schemas.microsoft.com/office/drawing/2014/main" id="{CF6AF9DD-E080-0B43-B255-BE52E67DB566}"/>
+              </a:ext>
+            </a:extLst>
+          </p:cNvPr>
+          <p:cNvSpPr>
+            <a:spLocks noGrp="1"/>
+          </p:cNvSpPr>
+          <p:nvPr>
+            <p:ph idx="1"/>
+          </p:nvPr>
+        </p:nvSpPr>
+        <p:spPr/>
+        <p:txBody>
+          <a:bodyPr>
+            <a:normAutofit/>
+          </a:bodyPr>
+          <a:lstStyle/>
+          <a:p>
+            <a:r>
+              <a:rPr lang="en-US" sz="2400" dirty="0"/>
+              <a:t>Are curly hair characteristics and products able to predict each other?</a:t>
+            </a:r>
+          </a:p>
+        </p:txBody>
+      </p:sp>
+    </p:spTree>
+    <p:extLst>
+      <p:ext uri="{BB962C8B-B14F-4D97-AF65-F5344CB8AC3E}">
+        <p14:creationId xmlns:p14="http://schemas.microsoft.com/office/powerpoint/2010/main" val="3649302373"/>
+      </p:ext>
+    </p:extLst>
+  </p:cSld>
+  <p:clrMapOvr>
+    <a:masterClrMapping/>
+  </p:clrMapOvr>
+</p:sld>
+</file>
+
+<file path=ppt/slides/slide4.xml><?xml version="1.0" encoding="utf-8"?>
+<p:sld xmlns:a="http://schemas.openxmlformats.org/drawingml/2006/main" xmlns:r="http://schemas.openxmlformats.org/officeDocument/2006/relationships" xmlns:p="http://schemas.openxmlformats.org/presentationml/2006/main">
+  <p:cSld>
+    <p:spTree>
+      <p:nvGrpSpPr>
+        <p:cNvPr id="1" name=""/>
+        <p:cNvGrpSpPr/>
+        <p:nvPr/>
+      </p:nvGrpSpPr>
+      <p:grpSpPr>
+        <a:xfrm>
+          <a:off x="0" y="0"/>
+          <a:ext cx="0" cy="0"/>
+          <a:chOff x="0" y="0"/>
+          <a:chExt cx="0" cy="0"/>
+        </a:xfrm>
+      </p:grpSpPr>
+      <p:sp>
+        <p:nvSpPr>
           <p:cNvPr id="3" name="Content Placeholder 2">
             <a:extLst>
               <a:ext uri="{FF2B5EF4-FFF2-40B4-BE49-F238E27FC236}">
@@ -6252,7 +6491,7 @@
 </p:sld>
 </file>
 
-<file path=ppt/slides/slide4.xml><?xml version="1.0" encoding="utf-8"?>
+<file path=ppt/slides/slide5.xml><?xml version="1.0" encoding="utf-8"?>
 <p:sld xmlns:a="http://schemas.openxmlformats.org/drawingml/2006/main" xmlns:r="http://schemas.openxmlformats.org/officeDocument/2006/relationships" xmlns:p="http://schemas.openxmlformats.org/presentationml/2006/main">
   <p:cSld>
     <p:spTree>
@@ -6477,7 +6716,7 @@
 </p:sld>
 </file>
 
-<file path=ppt/slides/slide5.xml><?xml version="1.0" encoding="utf-8"?>
+<file path=ppt/slides/slide6.xml><?xml version="1.0" encoding="utf-8"?>
 <p:sld xmlns:a="http://schemas.openxmlformats.org/drawingml/2006/main" xmlns:r="http://schemas.openxmlformats.org/officeDocument/2006/relationships" xmlns:p="http://schemas.openxmlformats.org/presentationml/2006/main">
   <p:cSld>
     <p:spTree>
@@ -6739,7 +6978,7 @@
 </p:sld>
 </file>
 
-<file path=ppt/slides/slide6.xml><?xml version="1.0" encoding="utf-8"?>
+<file path=ppt/slides/slide7.xml><?xml version="1.0" encoding="utf-8"?>
 <p:sld xmlns:a="http://schemas.openxmlformats.org/drawingml/2006/main" xmlns:r="http://schemas.openxmlformats.org/officeDocument/2006/relationships" xmlns:p="http://schemas.openxmlformats.org/presentationml/2006/main">
   <p:cSld>
     <p:spTree>
@@ -6952,146 +7191,6 @@
 </p:sld>
 </file>
 
-<file path=ppt/slides/slide7.xml><?xml version="1.0" encoding="utf-8"?>
-<p:sld xmlns:a="http://schemas.openxmlformats.org/drawingml/2006/main" xmlns:r="http://schemas.openxmlformats.org/officeDocument/2006/relationships" xmlns:p="http://schemas.openxmlformats.org/presentationml/2006/main">
-  <p:cSld>
-    <p:spTree>
-      <p:nvGrpSpPr>
-        <p:cNvPr id="1" name=""/>
-        <p:cNvGrpSpPr/>
-        <p:nvPr/>
-      </p:nvGrpSpPr>
-      <p:grpSpPr>
-        <a:xfrm>
-          <a:off x="0" y="0"/>
-          <a:ext cx="0" cy="0"/>
-          <a:chOff x="0" y="0"/>
-          <a:chExt cx="0" cy="0"/>
-        </a:xfrm>
-      </p:grpSpPr>
-      <p:sp>
-        <p:nvSpPr>
-          <p:cNvPr id="2" name="Title 1">
-            <a:extLst>
-              <a:ext uri="{FF2B5EF4-FFF2-40B4-BE49-F238E27FC236}">
-                <a16:creationId xmlns:a16="http://schemas.microsoft.com/office/drawing/2014/main" id="{6FB739D1-F230-554A-B263-8508C2C8DDD3}"/>
-              </a:ext>
-            </a:extLst>
-          </p:cNvPr>
-          <p:cNvSpPr>
-            <a:spLocks noGrp="1"/>
-          </p:cNvSpPr>
-          <p:nvPr>
-            <p:ph type="title"/>
-          </p:nvPr>
-        </p:nvSpPr>
-        <p:spPr/>
-        <p:txBody>
-          <a:bodyPr/>
-          <a:lstStyle/>
-          <a:p>
-            <a:r>
-              <a:rPr lang="en-US" dirty="0"/>
-              <a:t>Challenges</a:t>
-            </a:r>
-          </a:p>
-        </p:txBody>
-      </p:sp>
-      <p:sp>
-        <p:nvSpPr>
-          <p:cNvPr id="3" name="Content Placeholder 2">
-            <a:extLst>
-              <a:ext uri="{FF2B5EF4-FFF2-40B4-BE49-F238E27FC236}">
-                <a16:creationId xmlns:a16="http://schemas.microsoft.com/office/drawing/2014/main" id="{0BD14B21-F743-E748-AAF0-56F2AFC31F0B}"/>
-              </a:ext>
-            </a:extLst>
-          </p:cNvPr>
-          <p:cNvSpPr>
-            <a:spLocks noGrp="1"/>
-          </p:cNvSpPr>
-          <p:nvPr>
-            <p:ph idx="1"/>
-          </p:nvPr>
-        </p:nvSpPr>
-        <p:spPr/>
-        <p:txBody>
-          <a:bodyPr/>
-          <a:lstStyle/>
-          <a:p>
-            <a:r>
-              <a:rPr lang="en-US" dirty="0"/>
-              <a:t>Natural language is </a:t>
-            </a:r>
-            <a:r>
-              <a:rPr lang="en-US" i="1" dirty="0"/>
-              <a:t>very</a:t>
-            </a:r>
-            <a:r>
-              <a:rPr lang="en-US" dirty="0"/>
-              <a:t> messy</a:t>
-            </a:r>
-          </a:p>
-          <a:p>
-            <a:pPr lvl="1"/>
-            <a:r>
-              <a:rPr lang="en-US" dirty="0"/>
-              <a:t>No uniform format</a:t>
-            </a:r>
-          </a:p>
-          <a:p>
-            <a:pPr lvl="1"/>
-            <a:r>
-              <a:rPr lang="en-US" dirty="0"/>
-              <a:t>Not all curly hair relevant</a:t>
-            </a:r>
-          </a:p>
-          <a:p>
-            <a:pPr lvl="1"/>
-            <a:r>
-              <a:rPr lang="en-US" dirty="0"/>
-              <a:t>Acronyms</a:t>
-            </a:r>
-          </a:p>
-          <a:p>
-            <a:pPr lvl="1"/>
-            <a:r>
-              <a:rPr lang="en-US" dirty="0"/>
-              <a:t>Different phrases to mean the same thing</a:t>
-            </a:r>
-          </a:p>
-          <a:p>
-            <a:r>
-              <a:rPr lang="en-US" dirty="0"/>
-              <a:t>Uneven class distributions</a:t>
-            </a:r>
-          </a:p>
-          <a:p>
-            <a:r>
-              <a:rPr lang="en-US" dirty="0"/>
-              <a:t>No obvious product dictionary</a:t>
-            </a:r>
-          </a:p>
-          <a:p>
-            <a:pPr marL="0" indent="0">
-              <a:buNone/>
-            </a:pPr>
-            <a:endParaRPr lang="en-US" dirty="0"/>
-          </a:p>
-        </p:txBody>
-      </p:sp>
-    </p:spTree>
-    <p:extLst>
-      <p:ext uri="{BB962C8B-B14F-4D97-AF65-F5344CB8AC3E}">
-        <p14:creationId xmlns:p14="http://schemas.microsoft.com/office/powerpoint/2010/main" val="452787329"/>
-      </p:ext>
-    </p:extLst>
-  </p:cSld>
-  <p:clrMapOvr>
-    <a:masterClrMapping/>
-  </p:clrMapOvr>
-</p:sld>
-</file>
-
 <file path=ppt/slides/slide8.xml><?xml version="1.0" encoding="utf-8"?>
 <p:sld xmlns:a="http://schemas.openxmlformats.org/drawingml/2006/main" xmlns:r="http://schemas.openxmlformats.org/officeDocument/2006/relationships" xmlns:p="http://schemas.openxmlformats.org/presentationml/2006/main">
   <p:cSld>
@@ -7114,7 +7213,7 @@
           <p:cNvPr id="2" name="Title 1">
             <a:extLst>
               <a:ext uri="{FF2B5EF4-FFF2-40B4-BE49-F238E27FC236}">
-                <a16:creationId xmlns:a16="http://schemas.microsoft.com/office/drawing/2014/main" id="{F9681D51-FFD0-AE45-AA96-20BC96DC81A4}"/>
+                <a16:creationId xmlns:a16="http://schemas.microsoft.com/office/drawing/2014/main" id="{6FB739D1-F230-554A-B263-8508C2C8DDD3}"/>
               </a:ext>
             </a:extLst>
           </p:cNvPr>
@@ -7132,7 +7231,7 @@
           <a:p>
             <a:r>
               <a:rPr lang="en-US" dirty="0"/>
-              <a:t>TF-IDF</a:t>
+              <a:t>Challenges</a:t>
             </a:r>
           </a:p>
         </p:txBody>
@@ -7142,7 +7241,7 @@
           <p:cNvPr id="3" name="Content Placeholder 2">
             <a:extLst>
               <a:ext uri="{FF2B5EF4-FFF2-40B4-BE49-F238E27FC236}">
-                <a16:creationId xmlns:a16="http://schemas.microsoft.com/office/drawing/2014/main" id="{28FBEE48-52C1-0D41-A85A-D1EE7070C7DC}"/>
+                <a16:creationId xmlns:a16="http://schemas.microsoft.com/office/drawing/2014/main" id="{0BD14B21-F743-E748-AAF0-56F2AFC31F0B}"/>
               </a:ext>
             </a:extLst>
           </p:cNvPr>
@@ -7158,14 +7257,78 @@
           <a:bodyPr/>
           <a:lstStyle/>
           <a:p>
-            <a:endParaRPr lang="en-US"/>
+            <a:r>
+              <a:rPr lang="en-US" dirty="0"/>
+              <a:t>Natural language is </a:t>
+            </a:r>
+            <a:r>
+              <a:rPr lang="en-US" i="1" dirty="0"/>
+              <a:t>very</a:t>
+            </a:r>
+            <a:r>
+              <a:rPr lang="en-US" dirty="0"/>
+              <a:t> messy</a:t>
+            </a:r>
+          </a:p>
+          <a:p>
+            <a:pPr lvl="1"/>
+            <a:r>
+              <a:rPr lang="en-US" dirty="0"/>
+              <a:t>No uniform format</a:t>
+            </a:r>
+          </a:p>
+          <a:p>
+            <a:pPr lvl="1"/>
+            <a:r>
+              <a:rPr lang="en-US" dirty="0"/>
+              <a:t>Not all curly hair relevant</a:t>
+            </a:r>
+          </a:p>
+          <a:p>
+            <a:pPr lvl="1"/>
+            <a:r>
+              <a:rPr lang="en-US" dirty="0"/>
+              <a:t>Acronyms</a:t>
+            </a:r>
+          </a:p>
+          <a:p>
+            <a:pPr lvl="1"/>
+            <a:r>
+              <a:rPr lang="en-US" dirty="0"/>
+              <a:t>Different phrases to mean the same thing</a:t>
+            </a:r>
+          </a:p>
+          <a:p>
+            <a:pPr lvl="1"/>
+            <a:r>
+              <a:rPr lang="en-US" dirty="0"/>
+              <a:t>Inconsistent punctuation, spelling, and capitalization</a:t>
+            </a:r>
+          </a:p>
+          <a:p>
+            <a:r>
+              <a:rPr lang="en-US" dirty="0"/>
+              <a:t>Uneven class distributions</a:t>
+            </a:r>
+          </a:p>
+          <a:p>
+            <a:r>
+              <a:rPr lang="en-US" dirty="0"/>
+              <a:t>No obvious product dictionary</a:t>
+            </a:r>
+          </a:p>
+          <a:p>
+            <a:pPr marL="0" indent="0">
+              <a:buNone/>
+            </a:pPr>
+            <a:endParaRPr lang="en-US" dirty="0"/>
           </a:p>
         </p:txBody>
       </p:sp>
     </p:spTree>
     <p:extLst>
       <p:ext uri="{BB962C8B-B14F-4D97-AF65-F5344CB8AC3E}">
-        <p14:creationId xmlns:p14="http://schemas.microsoft.com/office/powerpoint/2010/main" val="140843379"/>
+        <p14:creationId xmlns:p14="http://schemas.microsoft.com/office/powerpoint/2010/main" val="452787329"/>
       </p:ext>
     </p:extLst>
   </p:cSld>
@@ -7197,7 +7360,7 @@
           <p:cNvPr id="2" name="Title 1">
             <a:extLst>
               <a:ext uri="{FF2B5EF4-FFF2-40B4-BE49-F238E27FC236}">
-                <a16:creationId xmlns:a16="http://schemas.microsoft.com/office/drawing/2014/main" id="{44FFD62D-2195-914A-A2EA-8D237D1B655C}"/>
+                <a16:creationId xmlns:a16="http://schemas.microsoft.com/office/drawing/2014/main" id="{F9681D51-FFD0-AE45-AA96-20BC96DC81A4}"/>
               </a:ext>
             </a:extLst>
           </p:cNvPr>
@@ -7213,7 +7376,10 @@
           <a:bodyPr/>
           <a:lstStyle/>
           <a:p>
-            <a:endParaRPr lang="en-US"/>
+            <a:r>
+              <a:rPr lang="en-US" dirty="0"/>
+              <a:t>Approach</a:t>
+            </a:r>
           </a:p>
         </p:txBody>
       </p:sp>
@@ -7222,7 +7388,7 @@
           <p:cNvPr id="3" name="Content Placeholder 2">
             <a:extLst>
               <a:ext uri="{FF2B5EF4-FFF2-40B4-BE49-F238E27FC236}">
-                <a16:creationId xmlns:a16="http://schemas.microsoft.com/office/drawing/2014/main" id="{35D98C07-1861-024E-BC0B-CDCD1C90C514}"/>
+                <a16:creationId xmlns:a16="http://schemas.microsoft.com/office/drawing/2014/main" id="{28FBEE48-52C1-0D41-A85A-D1EE7070C7DC}"/>
               </a:ext>
             </a:extLst>
           </p:cNvPr>
@@ -7238,14 +7404,43 @@
           <a:bodyPr/>
           <a:lstStyle/>
           <a:p>
-            <a:endParaRPr lang="en-US"/>
+            <a:r>
+              <a:rPr lang="en-US" dirty="0"/>
+              <a:t>Heavy usage of regular expressions to clean the data up</a:t>
+            </a:r>
+          </a:p>
+          <a:p>
+            <a:r>
+              <a:rPr lang="en-US" dirty="0"/>
+              <a:t>Label and remove the four characteristics from each signature if present</a:t>
+            </a:r>
+          </a:p>
+          <a:p>
+            <a:r>
+              <a:rPr lang="en-US" dirty="0"/>
+              <a:t>Inspect various </a:t>
+            </a:r>
+            <a:r>
+              <a:rPr lang="en-US" dirty="0" err="1"/>
+              <a:t>Ngrams</a:t>
+            </a:r>
+            <a:r>
+              <a:rPr lang="en-US" dirty="0"/>
+              <a:t> for possible products</a:t>
+            </a:r>
+          </a:p>
+          <a:p>
+            <a:r>
+              <a:rPr lang="en-US" dirty="0"/>
+              <a:t>Perform TF-IDF on the products and use that as the feature and try to predict each characteristic category in return</a:t>
+            </a:r>
           </a:p>
         </p:txBody>
       </p:sp>
     </p:spTree>
     <p:extLst>
       <p:ext uri="{BB962C8B-B14F-4D97-AF65-F5344CB8AC3E}">
-        <p14:creationId xmlns:p14="http://schemas.microsoft.com/office/powerpoint/2010/main" val="1443540364"/>
+        <p14:creationId xmlns:p14="http://schemas.microsoft.com/office/powerpoint/2010/main" val="140843379"/>
       </p:ext>
     </p:extLst>
   </p:cSld>

</xml_diff>

<commit_message>
rough draft of slides
</commit_message>
<xml_diff>
--- a/results/Naturally_Curly.pptx
+++ b/results/Naturally_Curly.pptx
@@ -15,6 +15,7 @@
     <p:sldId id="263" r:id="rId9"/>
     <p:sldId id="262" r:id="rId10"/>
     <p:sldId id="264" r:id="rId11"/>
+    <p:sldId id="266" r:id="rId12"/>
   </p:sldIdLst>
   <p:sldSz cx="12192000" cy="6858000"/>
   <p:notesSz cx="6858000" cy="9144000"/>
@@ -5974,10 +5975,9 @@
           <a:lstStyle/>
           <a:p>
             <a:r>
-              <a:rPr lang="en-US"/>
+              <a:rPr lang="en-US" dirty="0"/>
               <a:t>Models Used:</a:t>
             </a:r>
-            <a:endParaRPr lang="en-US" dirty="0"/>
           </a:p>
           <a:p>
             <a:pPr lvl="1"/>
@@ -6036,7 +6036,7 @@
           <a:p>
             <a:r>
               <a:rPr lang="en-US" dirty="0"/>
-              <a:t>Logistic Regression was consistently outperforming other models and Multinomial Naïve Bayes was a close second</a:t>
+              <a:t>Logistic Regression consistently outperforms other models and Multinomial Naïve Bayes is a close second</a:t>
             </a:r>
           </a:p>
           <a:p>
@@ -6048,6 +6048,114 @@
     <p:extLst>
       <p:ext uri="{BB962C8B-B14F-4D97-AF65-F5344CB8AC3E}">
         <p14:creationId xmlns:p14="http://schemas.microsoft.com/office/powerpoint/2010/main" val="1443540364"/>
+      </p:ext>
+    </p:extLst>
+  </p:cSld>
+  <p:clrMapOvr>
+    <a:masterClrMapping/>
+  </p:clrMapOvr>
+</p:sld>
+</file>
+
+<file path=ppt/slides/slide11.xml><?xml version="1.0" encoding="utf-8"?>
+<p:sld xmlns:a="http://schemas.openxmlformats.org/drawingml/2006/main" xmlns:r="http://schemas.openxmlformats.org/officeDocument/2006/relationships" xmlns:p="http://schemas.openxmlformats.org/presentationml/2006/main">
+  <p:cSld>
+    <p:spTree>
+      <p:nvGrpSpPr>
+        <p:cNvPr id="1" name=""/>
+        <p:cNvGrpSpPr/>
+        <p:nvPr/>
+      </p:nvGrpSpPr>
+      <p:grpSpPr>
+        <a:xfrm>
+          <a:off x="0" y="0"/>
+          <a:ext cx="0" cy="0"/>
+          <a:chOff x="0" y="0"/>
+          <a:chExt cx="0" cy="0"/>
+        </a:xfrm>
+      </p:grpSpPr>
+      <p:sp>
+        <p:nvSpPr>
+          <p:cNvPr id="2" name="Title 1">
+            <a:extLst>
+              <a:ext uri="{FF2B5EF4-FFF2-40B4-BE49-F238E27FC236}">
+                <a16:creationId xmlns:a16="http://schemas.microsoft.com/office/drawing/2014/main" id="{9A6F2DC0-7A99-1D4B-8BB8-F1A1DECB62AC}"/>
+              </a:ext>
+            </a:extLst>
+          </p:cNvPr>
+          <p:cNvSpPr>
+            <a:spLocks noGrp="1"/>
+          </p:cNvSpPr>
+          <p:nvPr>
+            <p:ph type="title"/>
+          </p:nvPr>
+        </p:nvSpPr>
+        <p:spPr/>
+        <p:txBody>
+          <a:bodyPr/>
+          <a:lstStyle/>
+          <a:p>
+            <a:r>
+              <a:rPr lang="en-US" dirty="0"/>
+              <a:t>Conclusion</a:t>
+            </a:r>
+          </a:p>
+        </p:txBody>
+      </p:sp>
+      <p:sp>
+        <p:nvSpPr>
+          <p:cNvPr id="3" name="Content Placeholder 2">
+            <a:extLst>
+              <a:ext uri="{FF2B5EF4-FFF2-40B4-BE49-F238E27FC236}">
+                <a16:creationId xmlns:a16="http://schemas.microsoft.com/office/drawing/2014/main" id="{0E8D8E3E-DAF7-E34C-9C7C-721A6049A50A}"/>
+              </a:ext>
+            </a:extLst>
+          </p:cNvPr>
+          <p:cNvSpPr>
+            <a:spLocks noGrp="1"/>
+          </p:cNvSpPr>
+          <p:nvPr>
+            <p:ph idx="1"/>
+          </p:nvPr>
+        </p:nvSpPr>
+        <p:spPr/>
+        <p:txBody>
+          <a:bodyPr/>
+          <a:lstStyle/>
+          <a:p>
+            <a:r>
+              <a:rPr lang="en-US" dirty="0"/>
+              <a:t>All models for each characteristic that was attempting to be predicted performed better than random guessing</a:t>
+            </a:r>
+          </a:p>
+          <a:p>
+            <a:r>
+              <a:rPr lang="en-US" dirty="0"/>
+              <a:t>The product predictor text needs to be cleaned up more and non-relevant signatures discarded as well as all common acronyms</a:t>
+            </a:r>
+          </a:p>
+          <a:p>
+            <a:r>
+              <a:rPr lang="en-US" dirty="0" err="1"/>
+              <a:t>Upsampling</a:t>
+            </a:r>
+            <a:r>
+              <a:rPr lang="en-US" dirty="0"/>
+              <a:t> needs to be applied to even out class imbalances</a:t>
+            </a:r>
+          </a:p>
+          <a:p>
+            <a:r>
+              <a:rPr lang="en-US" dirty="0"/>
+              <a:t>Different scoring metrics can be examined as well for different insights into the data</a:t>
+            </a:r>
+          </a:p>
+        </p:txBody>
+      </p:sp>
+    </p:spTree>
+    <p:extLst>
+      <p:ext uri="{BB962C8B-B14F-4D97-AF65-F5344CB8AC3E}">
+        <p14:creationId xmlns:p14="http://schemas.microsoft.com/office/powerpoint/2010/main" val="402721694"/>
       </p:ext>
     </p:extLst>
   </p:cSld>
@@ -7315,6 +7423,12 @@
             <a:r>
               <a:rPr lang="en-US" dirty="0"/>
               <a:t>No obvious product dictionary</a:t>
+            </a:r>
+          </a:p>
+          <a:p>
+            <a:r>
+              <a:rPr lang="en-US" dirty="0"/>
+              <a:t>Order of words matters so a simple Bag of Words is insufficient</a:t>
             </a:r>
           </a:p>
           <a:p>

</xml_diff>

<commit_message>
fixed some typos and added tittkes
</commit_message>
<xml_diff>
--- a/results/Naturally_Curly.pptx
+++ b/results/Naturally_Curly.pptx
@@ -6120,7 +6120,7 @@
           <a:p>
             <a:r>
               <a:rPr lang="en-US" dirty="0"/>
-              <a:t>Conclusion</a:t>
+              <a:t>Conclusions &amp; Future Work</a:t>
             </a:r>
           </a:p>
         </p:txBody>
@@ -6161,6 +6161,14 @@
             <a:r>
               <a:rPr lang="en-US" dirty="0" err="1"/>
               <a:t>Upsampling</a:t>
+            </a:r>
+            <a:r>
+              <a:rPr lang="en-US" dirty="0"/>
+              <a:t> or </a:t>
+            </a:r>
+            <a:r>
+              <a:rPr lang="en-US" dirty="0" err="1"/>
+              <a:t>downsampling</a:t>
             </a:r>
             <a:r>
               <a:rPr lang="en-US" dirty="0"/>
@@ -6634,12 +6642,16 @@
           <a:lstStyle/>
           <a:p>
             <a:r>
+              <a:rPr lang="en-US" dirty="0"/>
+              <a:t>“</a:t>
+            </a:r>
+            <a:r>
               <a:rPr lang="en-US" dirty="0" err="1"/>
               <a:t>NaturallyCurly.com</a:t>
             </a:r>
             <a:r>
               <a:rPr lang="en-US" dirty="0"/>
-              <a:t> is the leading resource for the natural and textured hair community, giving every member a voice in a space seeing significant growth and change.</a:t>
+              <a:t> is the leading resource for the natural and textured hair community, giving every member a voice in a space seeing significant growth and change.”</a:t>
             </a:r>
           </a:p>
           <a:p>
@@ -7280,7 +7292,7 @@
           <a:p>
             <a:r>
               <a:rPr lang="en-US" dirty="0" err="1"/>
-              <a:t>DavaCurl</a:t>
+              <a:t>DevaCurl</a:t>
             </a:r>
             <a:endParaRPr lang="en-US" dirty="0"/>
           </a:p>

</xml_diff>